<commit_message>
Update WIP CICD for distributed teams, merge requests and gitops
</commit_message>
<xml_diff>
--- a/CICD for distributed teams.pptx
+++ b/CICD for distributed teams.pptx
@@ -5,10 +5,10 @@
     <p:sldMasterId id="2147483648" r:id="rId4"/>
   </p:sldMasterIdLst>
   <p:notesMasterIdLst>
-    <p:notesMasterId r:id="rId14"/>
+    <p:notesMasterId r:id="rId16"/>
   </p:notesMasterIdLst>
   <p:handoutMasterIdLst>
-    <p:handoutMasterId r:id="rId15"/>
+    <p:handoutMasterId r:id="rId17"/>
   </p:handoutMasterIdLst>
   <p:sldIdLst>
     <p:sldId id="257" r:id="rId5"/>
@@ -18,8 +18,10 @@
     <p:sldId id="264" r:id="rId9"/>
     <p:sldId id="265" r:id="rId10"/>
     <p:sldId id="261" r:id="rId11"/>
-    <p:sldId id="262" r:id="rId12"/>
-    <p:sldId id="263" r:id="rId13"/>
+    <p:sldId id="266" r:id="rId12"/>
+    <p:sldId id="262" r:id="rId13"/>
+    <p:sldId id="263" r:id="rId14"/>
+    <p:sldId id="267" r:id="rId15"/>
   </p:sldIdLst>
   <p:sldSz cx="9144000" cy="5143500" type="screen16x9"/>
   <p:notesSz cx="6858000" cy="9144000"/>
@@ -4596,6 +4598,90 @@
 </p:notes>
 </file>
 
+<file path=ppt/notesSlides/notesSlide10.xml><?xml version="1.0" encoding="utf-8"?>
+<p:notes xmlns:a="http://schemas.openxmlformats.org/drawingml/2006/main" xmlns:r="http://schemas.openxmlformats.org/officeDocument/2006/relationships" xmlns:p="http://schemas.openxmlformats.org/presentationml/2006/main">
+  <p:cSld>
+    <p:spTree>
+      <p:nvGrpSpPr>
+        <p:cNvPr id="1" name=""/>
+        <p:cNvGrpSpPr/>
+        <p:nvPr/>
+      </p:nvGrpSpPr>
+      <p:grpSpPr>
+        <a:xfrm>
+          <a:off x="0" y="0"/>
+          <a:ext cx="0" cy="0"/>
+          <a:chOff x="0" y="0"/>
+          <a:chExt cx="0" cy="0"/>
+        </a:xfrm>
+      </p:grpSpPr>
+      <p:sp>
+        <p:nvSpPr>
+          <p:cNvPr id="2" name="Slide Image Placeholder 1"/>
+          <p:cNvSpPr>
+            <a:spLocks noGrp="1" noRot="1" noChangeAspect="1"/>
+          </p:cNvSpPr>
+          <p:nvPr>
+            <p:ph type="sldImg"/>
+          </p:nvPr>
+        </p:nvSpPr>
+        <p:spPr/>
+      </p:sp>
+      <p:sp>
+        <p:nvSpPr>
+          <p:cNvPr id="3" name="Notes Placeholder 2"/>
+          <p:cNvSpPr>
+            <a:spLocks noGrp="1"/>
+          </p:cNvSpPr>
+          <p:nvPr>
+            <p:ph type="body" idx="1"/>
+          </p:nvPr>
+        </p:nvSpPr>
+        <p:spPr/>
+        <p:txBody>
+          <a:bodyPr/>
+          <a:lstStyle/>
+          <a:p>
+            <a:endParaRPr lang="en-GB" dirty="0"/>
+          </a:p>
+        </p:txBody>
+      </p:sp>
+      <p:sp>
+        <p:nvSpPr>
+          <p:cNvPr id="4" name="Slide Number Placeholder 3"/>
+          <p:cNvSpPr>
+            <a:spLocks noGrp="1"/>
+          </p:cNvSpPr>
+          <p:nvPr>
+            <p:ph type="sldNum" sz="quarter" idx="5"/>
+          </p:nvPr>
+        </p:nvSpPr>
+        <p:spPr/>
+        <p:txBody>
+          <a:bodyPr/>
+          <a:lstStyle/>
+          <a:p>
+            <a:fld id="{E6864822-9A8D-43BE-9D90-9E1B34FBAC45}" type="slidenum">
+              <a:rPr lang="en-GB" smtClean="0"/>
+              <a:t>11</a:t>
+            </a:fld>
+            <a:endParaRPr lang="en-GB"/>
+          </a:p>
+        </p:txBody>
+      </p:sp>
+    </p:spTree>
+    <p:extLst>
+      <p:ext uri="{BB962C8B-B14F-4D97-AF65-F5344CB8AC3E}">
+        <p14:creationId xmlns:p14="http://schemas.microsoft.com/office/powerpoint/2010/main" val="32835070"/>
+      </p:ext>
+    </p:extLst>
+  </p:cSld>
+  <p:clrMapOvr>
+    <a:masterClrMapping/>
+  </p:clrMapOvr>
+</p:notes>
+</file>
+
 <file path=ppt/notesSlides/notesSlide2.xml><?xml version="1.0" encoding="utf-8"?>
 <p:notes xmlns:a="http://schemas.openxmlformats.org/drawingml/2006/main" xmlns:r="http://schemas.openxmlformats.org/officeDocument/2006/relationships" xmlns:p="http://schemas.openxmlformats.org/presentationml/2006/main">
   <p:cSld>
@@ -5090,7 +5176,7 @@
     </p:spTree>
     <p:extLst>
       <p:ext uri="{BB962C8B-B14F-4D97-AF65-F5344CB8AC3E}">
-        <p14:creationId xmlns:p14="http://schemas.microsoft.com/office/powerpoint/2010/main" val="1638870408"/>
+        <p14:creationId xmlns:p14="http://schemas.microsoft.com/office/powerpoint/2010/main" val="920252009"/>
       </p:ext>
     </p:extLst>
   </p:cSld>
@@ -5166,6 +5252,90 @@
             <a:fld id="{E6864822-9A8D-43BE-9D90-9E1B34FBAC45}" type="slidenum">
               <a:rPr lang="en-GB" smtClean="0"/>
               <a:t>9</a:t>
+            </a:fld>
+            <a:endParaRPr lang="en-GB"/>
+          </a:p>
+        </p:txBody>
+      </p:sp>
+    </p:spTree>
+    <p:extLst>
+      <p:ext uri="{BB962C8B-B14F-4D97-AF65-F5344CB8AC3E}">
+        <p14:creationId xmlns:p14="http://schemas.microsoft.com/office/powerpoint/2010/main" val="1638870408"/>
+      </p:ext>
+    </p:extLst>
+  </p:cSld>
+  <p:clrMapOvr>
+    <a:masterClrMapping/>
+  </p:clrMapOvr>
+</p:notes>
+</file>
+
+<file path=ppt/notesSlides/notesSlide9.xml><?xml version="1.0" encoding="utf-8"?>
+<p:notes xmlns:a="http://schemas.openxmlformats.org/drawingml/2006/main" xmlns:r="http://schemas.openxmlformats.org/officeDocument/2006/relationships" xmlns:p="http://schemas.openxmlformats.org/presentationml/2006/main">
+  <p:cSld>
+    <p:spTree>
+      <p:nvGrpSpPr>
+        <p:cNvPr id="1" name=""/>
+        <p:cNvGrpSpPr/>
+        <p:nvPr/>
+      </p:nvGrpSpPr>
+      <p:grpSpPr>
+        <a:xfrm>
+          <a:off x="0" y="0"/>
+          <a:ext cx="0" cy="0"/>
+          <a:chOff x="0" y="0"/>
+          <a:chExt cx="0" cy="0"/>
+        </a:xfrm>
+      </p:grpSpPr>
+      <p:sp>
+        <p:nvSpPr>
+          <p:cNvPr id="2" name="Slide Image Placeholder 1"/>
+          <p:cNvSpPr>
+            <a:spLocks noGrp="1" noRot="1" noChangeAspect="1"/>
+          </p:cNvSpPr>
+          <p:nvPr>
+            <p:ph type="sldImg"/>
+          </p:nvPr>
+        </p:nvSpPr>
+        <p:spPr/>
+      </p:sp>
+      <p:sp>
+        <p:nvSpPr>
+          <p:cNvPr id="3" name="Notes Placeholder 2"/>
+          <p:cNvSpPr>
+            <a:spLocks noGrp="1"/>
+          </p:cNvSpPr>
+          <p:nvPr>
+            <p:ph type="body" idx="1"/>
+          </p:nvPr>
+        </p:nvSpPr>
+        <p:spPr/>
+        <p:txBody>
+          <a:bodyPr/>
+          <a:lstStyle/>
+          <a:p>
+            <a:endParaRPr lang="en-GB" dirty="0"/>
+          </a:p>
+        </p:txBody>
+      </p:sp>
+      <p:sp>
+        <p:nvSpPr>
+          <p:cNvPr id="4" name="Slide Number Placeholder 3"/>
+          <p:cNvSpPr>
+            <a:spLocks noGrp="1"/>
+          </p:cNvSpPr>
+          <p:nvPr>
+            <p:ph type="sldNum" sz="quarter" idx="5"/>
+          </p:nvPr>
+        </p:nvSpPr>
+        <p:spPr/>
+        <p:txBody>
+          <a:bodyPr/>
+          <a:lstStyle/>
+          <a:p>
+            <a:fld id="{E6864822-9A8D-43BE-9D90-9E1B34FBAC45}" type="slidenum">
+              <a:rPr lang="en-GB" smtClean="0"/>
+              <a:t>10</a:t>
             </a:fld>
             <a:endParaRPr lang="en-GB"/>
           </a:p>
@@ -14853,7 +15023,15 @@
           <a:p>
             <a:r>
               <a:rPr lang="en-GB" dirty="0"/>
-              <a:t>Tools and real working examples (GitLab-CI and EKScalibur)</a:t>
+              <a:t>Merge requests, </a:t>
+            </a:r>
+            <a:r>
+              <a:rPr lang="en-GB" dirty="0" err="1"/>
+              <a:t>GitOps</a:t>
+            </a:r>
+            <a:r>
+              <a:rPr lang="en-GB" dirty="0"/>
+              <a:t> and real-world examples (GitLab-CI and EKScalibur)</a:t>
             </a:r>
             <a:endParaRPr lang="en-US" sz="1600" dirty="0"/>
           </a:p>
@@ -14943,25 +15121,70 @@
           </a:p>
         </p:txBody>
       </p:sp>
+    </p:spTree>
+    <p:extLst>
+      <p:ext uri="{BB962C8B-B14F-4D97-AF65-F5344CB8AC3E}">
+        <p14:creationId xmlns:p14="http://schemas.microsoft.com/office/powerpoint/2010/main" val="1639767706"/>
+      </p:ext>
+    </p:extLst>
+  </p:cSld>
+  <p:clrMapOvr>
+    <a:masterClrMapping/>
+  </p:clrMapOvr>
+  <mc:AlternateContent xmlns:mc="http://schemas.openxmlformats.org/markup-compatibility/2006" xmlns:p14="http://schemas.microsoft.com/office/powerpoint/2010/main">
+    <mc:Choice Requires="p14">
+      <p:transition spd="med" p14:dur="700">
+        <p:fade/>
+      </p:transition>
+    </mc:Choice>
+    <mc:Fallback xmlns="">
+      <p:transition spd="med">
+        <p:fade/>
+      </p:transition>
+    </mc:Fallback>
+  </mc:AlternateContent>
+</p:sld>
+</file>
+
+<file path=ppt/slides/slide10.xml><?xml version="1.0" encoding="utf-8"?>
+<p:sld xmlns:a="http://schemas.openxmlformats.org/drawingml/2006/main" xmlns:r="http://schemas.openxmlformats.org/officeDocument/2006/relationships" xmlns:p="http://schemas.openxmlformats.org/presentationml/2006/main">
+  <p:cSld>
+    <p:spTree>
+      <p:nvGrpSpPr>
+        <p:cNvPr id="1" name=""/>
+        <p:cNvGrpSpPr/>
+        <p:nvPr/>
+      </p:nvGrpSpPr>
+      <p:grpSpPr>
+        <a:xfrm>
+          <a:off x="0" y="0"/>
+          <a:ext cx="0" cy="0"/>
+          <a:chOff x="0" y="0"/>
+          <a:chExt cx="0" cy="0"/>
+        </a:xfrm>
+      </p:grpSpPr>
       <p:pic>
         <p:nvPicPr>
-          <p:cNvPr id="12" name="Graphic 4">
+          <p:cNvPr id="5" name="Content Placeholder 4" descr="A screenshot of a cell phone&#10;&#10;Description automatically generated">
+            <a:hlinkClick r:id="rId3"/>
             <a:extLst>
               <a:ext uri="{FF2B5EF4-FFF2-40B4-BE49-F238E27FC236}">
-                <a16:creationId xmlns:a16="http://schemas.microsoft.com/office/drawing/2014/main" id="{255F87B2-15E8-492B-8B39-78E7981C200A}"/>
+                <a16:creationId xmlns:a16="http://schemas.microsoft.com/office/drawing/2014/main" id="{09FE4AC3-8CE7-43FF-918B-F85849C46322}"/>
               </a:ext>
             </a:extLst>
           </p:cNvPr>
           <p:cNvPicPr>
-            <a:picLocks noChangeAspect="1"/>
+            <a:picLocks noGrp="1" noChangeAspect="1"/>
           </p:cNvPicPr>
-          <p:nvPr/>
+          <p:nvPr>
+            <p:ph idx="1"/>
+          </p:nvPr>
         </p:nvPicPr>
         <p:blipFill>
-          <a:blip r:embed="rId2">
+          <a:blip r:embed="rId4" cstate="print">
             <a:extLst>
-              <a:ext uri="{96DAC541-7B7A-43D3-8B79-37D633B846F1}">
-                <asvg:svgBlip xmlns:asvg="http://schemas.microsoft.com/office/drawing/2016/SVG/main" r:embed="rId3"/>
+              <a:ext uri="{28A0092B-C50C-407E-A947-70E740481C1C}">
+                <a14:useLocalDpi xmlns:a14="http://schemas.microsoft.com/office/drawing/2010/main" val="0"/>
               </a:ext>
             </a:extLst>
           </a:blip>
@@ -14971,56 +15194,405 @@
         </p:blipFill>
         <p:spPr>
           <a:xfrm>
-            <a:off x="953100" y="3973518"/>
-            <a:ext cx="650687" cy="633418"/>
+            <a:off x="2619173" y="583804"/>
+            <a:ext cx="4257877" cy="3852366"/>
+          </a:xfrm>
+        </p:spPr>
+      </p:pic>
+      <p:sp>
+        <p:nvSpPr>
+          <p:cNvPr id="8" name="Title 7">
+            <a:extLst>
+              <a:ext uri="{FF2B5EF4-FFF2-40B4-BE49-F238E27FC236}">
+                <a16:creationId xmlns:a16="http://schemas.microsoft.com/office/drawing/2014/main" id="{DAC31B96-FCC4-4AA9-9148-9F7E4450E3AA}"/>
+              </a:ext>
+            </a:extLst>
+          </p:cNvPr>
+          <p:cNvSpPr>
+            <a:spLocks noGrp="1"/>
+          </p:cNvSpPr>
+          <p:nvPr>
+            <p:ph type="title"/>
+          </p:nvPr>
+        </p:nvSpPr>
+        <p:spPr/>
+        <p:txBody>
+          <a:bodyPr anchor="t">
+            <a:normAutofit/>
+          </a:bodyPr>
+          <a:lstStyle/>
+          <a:p>
+            <a:r>
+              <a:rPr lang="en-GB" dirty="0"/>
+              <a:t>EKScalibur CI/CD - Infrastructure</a:t>
+            </a:r>
+          </a:p>
+        </p:txBody>
+      </p:sp>
+      <p:sp>
+        <p:nvSpPr>
+          <p:cNvPr id="3" name="Date Placeholder 2">
+            <a:extLst>
+              <a:ext uri="{FF2B5EF4-FFF2-40B4-BE49-F238E27FC236}">
+                <a16:creationId xmlns:a16="http://schemas.microsoft.com/office/drawing/2014/main" id="{83531A92-ECB4-4F62-999B-1418641995B7}"/>
+              </a:ext>
+            </a:extLst>
+          </p:cNvPr>
+          <p:cNvSpPr>
+            <a:spLocks noGrp="1"/>
+          </p:cNvSpPr>
+          <p:nvPr>
+            <p:ph type="dt" sz="half" idx="10"/>
+          </p:nvPr>
+        </p:nvSpPr>
+        <p:spPr/>
+        <p:txBody>
+          <a:bodyPr anchor="ctr">
+            <a:normAutofit/>
+          </a:bodyPr>
+          <a:lstStyle/>
+          <a:p>
+            <a:pPr>
+              <a:spcAft>
+                <a:spcPts val="600"/>
+              </a:spcAft>
+            </a:pPr>
+            <a:fld id="{B14BA664-87AA-9C4A-ADC2-763D4F152A14}" type="datetime4">
+              <a:rPr lang="en-GB" smtClean="0"/>
+              <a:pPr>
+                <a:spcAft>
+                  <a:spcPts val="600"/>
+                </a:spcAft>
+              </a:pPr>
+              <a:t>21 September 2020</a:t>
+            </a:fld>
+            <a:endParaRPr lang="en-GB"/>
+          </a:p>
+        </p:txBody>
+      </p:sp>
+      <p:sp>
+        <p:nvSpPr>
+          <p:cNvPr id="6" name="Slide Number Placeholder 5">
+            <a:extLst>
+              <a:ext uri="{FF2B5EF4-FFF2-40B4-BE49-F238E27FC236}">
+                <a16:creationId xmlns:a16="http://schemas.microsoft.com/office/drawing/2014/main" id="{5792FBBA-2A8E-4A96-B407-0E78DCF264F9}"/>
+              </a:ext>
+            </a:extLst>
+          </p:cNvPr>
+          <p:cNvSpPr>
+            <a:spLocks noGrp="1"/>
+          </p:cNvSpPr>
+          <p:nvPr>
+            <p:ph type="sldNum" sz="quarter" idx="4"/>
+          </p:nvPr>
+        </p:nvSpPr>
+        <p:spPr/>
+        <p:txBody>
+          <a:bodyPr anchor="ctr">
+            <a:normAutofit/>
+          </a:bodyPr>
+          <a:lstStyle/>
+          <a:p>
+            <a:pPr>
+              <a:spcAft>
+                <a:spcPts val="600"/>
+              </a:spcAft>
+            </a:pPr>
+            <a:fld id="{8D96DCA0-AD7A-3849-B278-AAEE98B1A072}" type="slidenum">
+              <a:rPr lang="en-US" smtClean="0"/>
+              <a:pPr>
+                <a:spcAft>
+                  <a:spcPts val="600"/>
+                </a:spcAft>
+              </a:pPr>
+              <a:t>10</a:t>
+            </a:fld>
+            <a:endParaRPr lang="en-US"/>
+          </a:p>
+        </p:txBody>
+      </p:sp>
+      <p:sp>
+        <p:nvSpPr>
+          <p:cNvPr id="7" name="Footer Placeholder 6">
+            <a:extLst>
+              <a:ext uri="{FF2B5EF4-FFF2-40B4-BE49-F238E27FC236}">
+                <a16:creationId xmlns:a16="http://schemas.microsoft.com/office/drawing/2014/main" id="{AD7B6BBD-1498-41B0-9A67-BCCB294FF6DC}"/>
+              </a:ext>
+            </a:extLst>
+          </p:cNvPr>
+          <p:cNvSpPr>
+            <a:spLocks noGrp="1"/>
+          </p:cNvSpPr>
+          <p:nvPr>
+            <p:ph type="ftr" sz="quarter" idx="11"/>
+          </p:nvPr>
+        </p:nvSpPr>
+        <p:spPr/>
+        <p:txBody>
+          <a:bodyPr anchor="ctr">
+            <a:normAutofit/>
+          </a:bodyPr>
+          <a:lstStyle/>
+          <a:p>
+            <a:pPr>
+              <a:lnSpc>
+                <a:spcPct val="90000"/>
+              </a:lnSpc>
+              <a:spcAft>
+                <a:spcPts val="600"/>
+              </a:spcAft>
+            </a:pPr>
+            <a:r>
+              <a:rPr lang="en-US" sz="600"/>
+              <a:t>Daniele Iasella</a:t>
+            </a:r>
+          </a:p>
+        </p:txBody>
+      </p:sp>
+    </p:spTree>
+    <p:extLst>
+      <p:ext uri="{BB962C8B-B14F-4D97-AF65-F5344CB8AC3E}">
+        <p14:creationId xmlns:p14="http://schemas.microsoft.com/office/powerpoint/2010/main" val="2312897634"/>
+      </p:ext>
+    </p:extLst>
+  </p:cSld>
+  <p:clrMapOvr>
+    <a:masterClrMapping/>
+  </p:clrMapOvr>
+  <mc:AlternateContent xmlns:mc="http://schemas.openxmlformats.org/markup-compatibility/2006" xmlns:p14="http://schemas.microsoft.com/office/powerpoint/2010/main">
+    <mc:Choice Requires="p14">
+      <p:transition spd="med" p14:dur="700">
+        <p:fade/>
+      </p:transition>
+    </mc:Choice>
+    <mc:Fallback xmlns="">
+      <p:transition spd="med">
+        <p:fade/>
+      </p:transition>
+    </mc:Fallback>
+  </mc:AlternateContent>
+</p:sld>
+</file>
+
+<file path=ppt/slides/slide11.xml><?xml version="1.0" encoding="utf-8"?>
+<p:sld xmlns:a="http://schemas.openxmlformats.org/drawingml/2006/main" xmlns:r="http://schemas.openxmlformats.org/officeDocument/2006/relationships" xmlns:p="http://schemas.openxmlformats.org/presentationml/2006/main">
+  <p:cSld>
+    <p:spTree>
+      <p:nvGrpSpPr>
+        <p:cNvPr id="1" name=""/>
+        <p:cNvGrpSpPr/>
+        <p:nvPr/>
+      </p:nvGrpSpPr>
+      <p:grpSpPr>
+        <a:xfrm>
+          <a:off x="0" y="0"/>
+          <a:ext cx="0" cy="0"/>
+          <a:chOff x="0" y="0"/>
+          <a:chExt cx="0" cy="0"/>
+        </a:xfrm>
+      </p:grpSpPr>
+      <p:sp>
+        <p:nvSpPr>
+          <p:cNvPr id="8" name="Title 7">
+            <a:extLst>
+              <a:ext uri="{FF2B5EF4-FFF2-40B4-BE49-F238E27FC236}">
+                <a16:creationId xmlns:a16="http://schemas.microsoft.com/office/drawing/2014/main" id="{DAC31B96-FCC4-4AA9-9148-9F7E4450E3AA}"/>
+              </a:ext>
+            </a:extLst>
+          </p:cNvPr>
+          <p:cNvSpPr>
+            <a:spLocks noGrp="1"/>
+          </p:cNvSpPr>
+          <p:nvPr>
+            <p:ph type="title"/>
+          </p:nvPr>
+        </p:nvSpPr>
+        <p:spPr/>
+        <p:txBody>
+          <a:bodyPr anchor="t">
+            <a:normAutofit/>
+          </a:bodyPr>
+          <a:lstStyle/>
+          <a:p>
+            <a:r>
+              <a:rPr lang="en-GB" dirty="0"/>
+              <a:t>EKScalibur CI/CD - Application</a:t>
+            </a:r>
+          </a:p>
+        </p:txBody>
+      </p:sp>
+      <p:sp>
+        <p:nvSpPr>
+          <p:cNvPr id="3" name="Date Placeholder 2">
+            <a:extLst>
+              <a:ext uri="{FF2B5EF4-FFF2-40B4-BE49-F238E27FC236}">
+                <a16:creationId xmlns:a16="http://schemas.microsoft.com/office/drawing/2014/main" id="{83531A92-ECB4-4F62-999B-1418641995B7}"/>
+              </a:ext>
+            </a:extLst>
+          </p:cNvPr>
+          <p:cNvSpPr>
+            <a:spLocks noGrp="1"/>
+          </p:cNvSpPr>
+          <p:nvPr>
+            <p:ph type="dt" sz="half" idx="10"/>
+          </p:nvPr>
+        </p:nvSpPr>
+        <p:spPr/>
+        <p:txBody>
+          <a:bodyPr anchor="ctr">
+            <a:normAutofit/>
+          </a:bodyPr>
+          <a:lstStyle/>
+          <a:p>
+            <a:pPr>
+              <a:spcAft>
+                <a:spcPts val="600"/>
+              </a:spcAft>
+            </a:pPr>
+            <a:fld id="{B14BA664-87AA-9C4A-ADC2-763D4F152A14}" type="datetime4">
+              <a:rPr lang="en-GB" smtClean="0"/>
+              <a:pPr>
+                <a:spcAft>
+                  <a:spcPts val="600"/>
+                </a:spcAft>
+              </a:pPr>
+              <a:t>21 September 2020</a:t>
+            </a:fld>
+            <a:endParaRPr lang="en-GB"/>
+          </a:p>
+        </p:txBody>
+      </p:sp>
+      <p:sp>
+        <p:nvSpPr>
+          <p:cNvPr id="6" name="Slide Number Placeholder 5">
+            <a:extLst>
+              <a:ext uri="{FF2B5EF4-FFF2-40B4-BE49-F238E27FC236}">
+                <a16:creationId xmlns:a16="http://schemas.microsoft.com/office/drawing/2014/main" id="{5792FBBA-2A8E-4A96-B407-0E78DCF264F9}"/>
+              </a:ext>
+            </a:extLst>
+          </p:cNvPr>
+          <p:cNvSpPr>
+            <a:spLocks noGrp="1"/>
+          </p:cNvSpPr>
+          <p:nvPr>
+            <p:ph type="sldNum" sz="quarter" idx="4"/>
+          </p:nvPr>
+        </p:nvSpPr>
+        <p:spPr/>
+        <p:txBody>
+          <a:bodyPr anchor="ctr">
+            <a:normAutofit/>
+          </a:bodyPr>
+          <a:lstStyle/>
+          <a:p>
+            <a:pPr>
+              <a:spcAft>
+                <a:spcPts val="600"/>
+              </a:spcAft>
+            </a:pPr>
+            <a:fld id="{8D96DCA0-AD7A-3849-B278-AAEE98B1A072}" type="slidenum">
+              <a:rPr lang="en-US" smtClean="0"/>
+              <a:pPr>
+                <a:spcAft>
+                  <a:spcPts val="600"/>
+                </a:spcAft>
+              </a:pPr>
+              <a:t>11</a:t>
+            </a:fld>
+            <a:endParaRPr lang="en-US"/>
+          </a:p>
+        </p:txBody>
+      </p:sp>
+      <p:sp>
+        <p:nvSpPr>
+          <p:cNvPr id="7" name="Footer Placeholder 6">
+            <a:extLst>
+              <a:ext uri="{FF2B5EF4-FFF2-40B4-BE49-F238E27FC236}">
+                <a16:creationId xmlns:a16="http://schemas.microsoft.com/office/drawing/2014/main" id="{AD7B6BBD-1498-41B0-9A67-BCCB294FF6DC}"/>
+              </a:ext>
+            </a:extLst>
+          </p:cNvPr>
+          <p:cNvSpPr>
+            <a:spLocks noGrp="1"/>
+          </p:cNvSpPr>
+          <p:nvPr>
+            <p:ph type="ftr" sz="quarter" idx="11"/>
+          </p:nvPr>
+        </p:nvSpPr>
+        <p:spPr/>
+        <p:txBody>
+          <a:bodyPr anchor="ctr">
+            <a:normAutofit/>
+          </a:bodyPr>
+          <a:lstStyle/>
+          <a:p>
+            <a:pPr>
+              <a:lnSpc>
+                <a:spcPct val="90000"/>
+              </a:lnSpc>
+              <a:spcAft>
+                <a:spcPts val="600"/>
+              </a:spcAft>
+            </a:pPr>
+            <a:r>
+              <a:rPr lang="en-US" sz="600"/>
+              <a:t>Daniele Iasella</a:t>
+            </a:r>
+          </a:p>
+        </p:txBody>
+      </p:sp>
+      <p:pic>
+        <p:nvPicPr>
+          <p:cNvPr id="3080" name="Picture 8">
+            <a:hlinkClick r:id="rId3"/>
+            <a:extLst>
+              <a:ext uri="{FF2B5EF4-FFF2-40B4-BE49-F238E27FC236}">
+                <a16:creationId xmlns:a16="http://schemas.microsoft.com/office/drawing/2014/main" id="{0F9EBF6D-94DE-4083-A671-BC421C94F397}"/>
+              </a:ext>
+            </a:extLst>
+          </p:cNvPr>
+          <p:cNvPicPr>
+            <a:picLocks noChangeAspect="1" noChangeArrowheads="1"/>
+          </p:cNvPicPr>
+          <p:nvPr/>
+        </p:nvPicPr>
+        <p:blipFill>
+          <a:blip r:embed="rId4" cstate="print">
+            <a:extLst>
+              <a:ext uri="{28A0092B-C50C-407E-A947-70E740481C1C}">
+                <a14:useLocalDpi xmlns:a14="http://schemas.microsoft.com/office/drawing/2010/main" val="0"/>
+              </a:ext>
+            </a:extLst>
+          </a:blip>
+          <a:srcRect/>
+          <a:stretch>
+            <a:fillRect/>
+          </a:stretch>
+        </p:blipFill>
+        <p:spPr bwMode="auto">
+          <a:xfrm>
+            <a:off x="1655640" y="968047"/>
+            <a:ext cx="5612667" cy="3663385"/>
           </a:xfrm>
           <a:prstGeom prst="rect">
             <a:avLst/>
           </a:prstGeom>
+          <a:noFill/>
+          <a:extLst>
+            <a:ext uri="{909E8E84-426E-40DD-AFC4-6F175D3DCCD1}">
+              <a14:hiddenFill xmlns:a14="http://schemas.microsoft.com/office/drawing/2010/main">
+                <a:solidFill>
+                  <a:srgbClr val="FFFFFF"/>
+                </a:solidFill>
+              </a14:hiddenFill>
+            </a:ext>
+          </a:extLst>
         </p:spPr>
       </p:pic>
-      <p:sp>
-        <p:nvSpPr>
-          <p:cNvPr id="10" name="Rectangle 9">
-            <a:extLst>
-              <a:ext uri="{FF2B5EF4-FFF2-40B4-BE49-F238E27FC236}">
-                <a16:creationId xmlns:a16="http://schemas.microsoft.com/office/drawing/2014/main" id="{A8FFBE4F-7600-4866-8313-02710A010348}"/>
-              </a:ext>
-            </a:extLst>
-          </p:cNvPr>
-          <p:cNvSpPr/>
-          <p:nvPr/>
-        </p:nvSpPr>
-        <p:spPr>
-          <a:xfrm>
-            <a:off x="1603787" y="4136338"/>
-            <a:ext cx="1326004" cy="369332"/>
-          </a:xfrm>
-          <a:prstGeom prst="rect">
-            <a:avLst/>
-          </a:prstGeom>
-        </p:spPr>
-        <p:txBody>
-          <a:bodyPr wrap="none">
-            <a:spAutoFit/>
-          </a:bodyPr>
-          <a:lstStyle/>
-          <a:p>
-            <a:r>
-              <a:rPr lang="en-US" sz="1800" dirty="0">
-                <a:solidFill>
-                  <a:schemeClr val="bg1"/>
-                </a:solidFill>
-              </a:rPr>
-              <a:t>EKScalibur</a:t>
-            </a:r>
-          </a:p>
-        </p:txBody>
-      </p:sp>
     </p:spTree>
     <p:extLst>
       <p:ext uri="{BB962C8B-B14F-4D97-AF65-F5344CB8AC3E}">
-        <p14:creationId xmlns:p14="http://schemas.microsoft.com/office/powerpoint/2010/main" val="1639767706"/>
+        <p14:creationId xmlns:p14="http://schemas.microsoft.com/office/powerpoint/2010/main" val="756429597"/>
       </p:ext>
     </p:extLst>
   </p:cSld>
@@ -15335,7 +15907,16 @@
           <a:p>
             <a:r>
               <a:rPr lang="en-GB" dirty="0"/>
-              <a:t>This session is called CICD for distributed teams but today every team is a distributed team due to WFH and teams structure.</a:t>
+              <a:t>Today every team is a distributed team due to WFH and teams structure.</a:t>
+            </a:r>
+          </a:p>
+          <a:p>
+            <a:endParaRPr lang="en-GB" dirty="0"/>
+          </a:p>
+          <a:p>
+            <a:r>
+              <a:rPr lang="en-GB" dirty="0"/>
+              <a:t>We are not going to touch anyway of working like agile / scrum methodologies during this session.</a:t>
             </a:r>
           </a:p>
         </p:txBody>
@@ -16354,19 +16935,51 @@
             <a:spLocks noGrp="1"/>
           </p:cNvSpPr>
           <p:nvPr>
-            <p:ph sz="half" idx="2"/>
-          </p:nvPr>
-        </p:nvSpPr>
-        <p:spPr>
-          <a:xfrm>
-            <a:off x="939245" y="3905249"/>
-            <a:ext cx="7236024" cy="676275"/>
-          </a:xfrm>
-        </p:spPr>
+            <p:ph idx="1"/>
+          </p:nvPr>
+        </p:nvSpPr>
+        <p:spPr/>
         <p:txBody>
           <a:bodyPr/>
           <a:lstStyle/>
           <a:p>
+            <a:r>
+              <a:rPr lang="en-GB" dirty="0" err="1"/>
+              <a:t>GitOps</a:t>
+            </a:r>
+            <a:r>
+              <a:rPr lang="en-GB" dirty="0"/>
+              <a:t> is a way of implementing Continuous Deployment for cloud native applications.</a:t>
+            </a:r>
+          </a:p>
+          <a:p>
+            <a:endParaRPr lang="en-GB" dirty="0"/>
+          </a:p>
+          <a:p>
+            <a:r>
+              <a:rPr lang="en-GB" dirty="0"/>
+              <a:t>The core idea of </a:t>
+            </a:r>
+            <a:r>
+              <a:rPr lang="en-GB" dirty="0" err="1"/>
+              <a:t>GitOps</a:t>
+            </a:r>
+            <a:r>
+              <a:rPr lang="en-GB" dirty="0"/>
+              <a:t> is having a Git repository that always contains declarative descriptions of the infrastructure currently desired in the production environment and an automated process to make the production environment match the described state in the repository</a:t>
+            </a:r>
+            <a:br>
+              <a:rPr lang="en-GB" dirty="0"/>
+            </a:br>
+            <a:br>
+              <a:rPr lang="en-GB" dirty="0"/>
+            </a:br>
+            <a:br>
+              <a:rPr lang="en-GB" i="1" dirty="0">
+                <a:latin typeface="Times New Roman" panose="02020603050405020304" pitchFamily="18" charset="0"/>
+                <a:cs typeface="Times New Roman" panose="02020603050405020304" pitchFamily="18" charset="0"/>
+              </a:rPr>
+            </a:br>
             <a:r>
               <a:rPr lang="en-GB" i="1" dirty="0" err="1">
                 <a:latin typeface="Times New Roman" panose="02020603050405020304" pitchFamily="18" charset="0"/>
@@ -16498,63 +17111,6 @@
       </p:sp>
       <p:sp>
         <p:nvSpPr>
-          <p:cNvPr id="4" name="Content Placeholder 3">
-            <a:extLst>
-              <a:ext uri="{FF2B5EF4-FFF2-40B4-BE49-F238E27FC236}">
-                <a16:creationId xmlns:a16="http://schemas.microsoft.com/office/drawing/2014/main" id="{2827A0F8-7E51-4FE7-9F10-303CA8675430}"/>
-              </a:ext>
-            </a:extLst>
-          </p:cNvPr>
-          <p:cNvSpPr>
-            <a:spLocks noGrp="1"/>
-          </p:cNvSpPr>
-          <p:nvPr>
-            <p:ph sz="half" idx="11"/>
-          </p:nvPr>
-        </p:nvSpPr>
-        <p:spPr>
-          <a:xfrm>
-            <a:off x="939245" y="1346501"/>
-            <a:ext cx="7222769" cy="2124073"/>
-          </a:xfrm>
-        </p:spPr>
-        <p:txBody>
-          <a:bodyPr/>
-          <a:lstStyle/>
-          <a:p>
-            <a:r>
-              <a:rPr lang="en-GB" dirty="0" err="1"/>
-              <a:t>GitOps</a:t>
-            </a:r>
-            <a:r>
-              <a:rPr lang="en-GB" dirty="0"/>
-              <a:t> is a way of implementing Continuous Deployment for cloud native applications.</a:t>
-            </a:r>
-          </a:p>
-          <a:p>
-            <a:endParaRPr lang="en-GB" dirty="0"/>
-          </a:p>
-          <a:p>
-            <a:r>
-              <a:rPr lang="en-GB" dirty="0"/>
-              <a:t>The core idea of </a:t>
-            </a:r>
-            <a:r>
-              <a:rPr lang="en-GB" dirty="0" err="1"/>
-              <a:t>GitOps</a:t>
-            </a:r>
-            <a:r>
-              <a:rPr lang="en-GB" dirty="0"/>
-              <a:t> is having a Git repository that always contains declarative descriptions of the infrastructure currently desired in the production environment and an automated process to make the production environment match the described state in the repository.</a:t>
-            </a:r>
-          </a:p>
-          <a:p>
-            <a:endParaRPr lang="en-GB" dirty="0"/>
-          </a:p>
-        </p:txBody>
-      </p:sp>
-      <p:sp>
-        <p:nvSpPr>
           <p:cNvPr id="7" name="Footer Placeholder 6">
             <a:extLst>
               <a:ext uri="{FF2B5EF4-FFF2-40B4-BE49-F238E27FC236}">
@@ -16566,7 +17122,7 @@
             <a:spLocks noGrp="1"/>
           </p:cNvSpPr>
           <p:nvPr>
-            <p:ph type="ftr" sz="quarter" idx="12"/>
+            <p:ph type="ftr" sz="quarter" idx="11"/>
           </p:nvPr>
         </p:nvSpPr>
         <p:spPr/>
@@ -16617,7 +17173,7 @@
 </file>
 
 <file path=ppt/slides/slide8.xml><?xml version="1.0" encoding="utf-8"?>
-<p:sld xmlns:a="http://schemas.openxmlformats.org/drawingml/2006/main" xmlns:r="http://schemas.openxmlformats.org/officeDocument/2006/relationships" xmlns:p="http://schemas.openxmlformats.org/presentationml/2006/main">
+<p:sld xmlns:a="http://schemas.openxmlformats.org/drawingml/2006/main" xmlns:r="http://schemas.openxmlformats.org/officeDocument/2006/relationships" xmlns:p="http://schemas.openxmlformats.org/presentationml/2006/main" show="0">
   <p:cSld>
     <p:spTree>
       <p:nvGrpSpPr>
@@ -16658,17 +17214,25 @@
           <a:p>
             <a:r>
               <a:rPr lang="en-GB" dirty="0"/>
-              <a:t>EKScalibur CI/CD - Infrastructure</a:t>
-            </a:r>
-          </a:p>
-        </p:txBody>
-      </p:sp>
-      <p:sp>
-        <p:nvSpPr>
-          <p:cNvPr id="2" name="Content Placeholder 1">
+              <a:t>How does </a:t>
+            </a:r>
+            <a:r>
+              <a:rPr lang="en-GB" dirty="0" err="1"/>
+              <a:t>GitOps</a:t>
+            </a:r>
+            <a:r>
+              <a:rPr lang="en-GB" dirty="0"/>
+              <a:t> work?</a:t>
+            </a:r>
+          </a:p>
+        </p:txBody>
+      </p:sp>
+      <p:sp>
+        <p:nvSpPr>
+          <p:cNvPr id="4" name="Content Placeholder 3">
             <a:extLst>
               <a:ext uri="{FF2B5EF4-FFF2-40B4-BE49-F238E27FC236}">
-                <a16:creationId xmlns:a16="http://schemas.microsoft.com/office/drawing/2014/main" id="{E770673B-66EF-43CF-AEB4-E3B048A4EFC9}"/>
+                <a16:creationId xmlns:a16="http://schemas.microsoft.com/office/drawing/2014/main" id="{2827A0F8-7E51-4FE7-9F10-303CA8675430}"/>
               </a:ext>
             </a:extLst>
           </p:cNvPr>
@@ -16683,6 +17247,54 @@
         <p:txBody>
           <a:bodyPr/>
           <a:lstStyle/>
+          <a:p>
+            <a:r>
+              <a:rPr lang="en-GB" dirty="0"/>
+              <a:t>Environment Configurations as Git repository</a:t>
+            </a:r>
+            <a:br>
+              <a:rPr lang="en-GB" dirty="0"/>
+            </a:br>
+            <a:r>
+              <a:rPr lang="en-GB" dirty="0"/>
+              <a:t>	</a:t>
+            </a:r>
+            <a:r>
+              <a:rPr lang="en-GB" sz="1100" dirty="0" err="1"/>
+              <a:t>GitOps</a:t>
+            </a:r>
+            <a:r>
+              <a:rPr lang="en-GB" sz="1100" dirty="0"/>
+              <a:t> organizes the deployment process around code repositories as the central element. There are 	at least two repositories: the application repository and the environment configuration repository.</a:t>
+            </a:r>
+          </a:p>
+          <a:p>
+            <a:endParaRPr lang="en-GB" dirty="0"/>
+          </a:p>
+          <a:p>
+            <a:r>
+              <a:rPr lang="en-GB" dirty="0"/>
+              <a:t>Push-based Deployments</a:t>
+            </a:r>
+          </a:p>
+          <a:p>
+            <a:endParaRPr lang="en-GB" dirty="0"/>
+          </a:p>
+          <a:p>
+            <a:endParaRPr lang="en-GB" dirty="0"/>
+          </a:p>
+          <a:p>
+            <a:r>
+              <a:rPr lang="en-GB" dirty="0"/>
+              <a:t>Pull-based Deployments</a:t>
+            </a:r>
+          </a:p>
+          <a:p>
+            <a:br>
+              <a:rPr lang="en-GB" dirty="0"/>
+            </a:br>
+            <a:endParaRPr lang="en-GB" dirty="0"/>
+          </a:p>
           <a:p>
             <a:endParaRPr lang="en-GB" dirty="0"/>
           </a:p>
@@ -16808,23 +17420,117 @@
           </a:p>
         </p:txBody>
       </p:sp>
+      <p:pic>
+        <p:nvPicPr>
+          <p:cNvPr id="1028" name="Picture 4" descr="Push-based Deployments">
+            <a:extLst>
+              <a:ext uri="{FF2B5EF4-FFF2-40B4-BE49-F238E27FC236}">
+                <a16:creationId xmlns:a16="http://schemas.microsoft.com/office/drawing/2014/main" id="{11447284-8330-450D-AF82-385C93EB93F8}"/>
+              </a:ext>
+            </a:extLst>
+          </p:cNvPr>
+          <p:cNvPicPr>
+            <a:picLocks noChangeAspect="1" noChangeArrowheads="1"/>
+          </p:cNvPicPr>
+          <p:nvPr/>
+        </p:nvPicPr>
+        <p:blipFill>
+          <a:blip r:embed="rId3" cstate="print">
+            <a:extLst>
+              <a:ext uri="{28A0092B-C50C-407E-A947-70E740481C1C}">
+                <a14:useLocalDpi xmlns:a14="http://schemas.microsoft.com/office/drawing/2010/main" val="0"/>
+              </a:ext>
+            </a:extLst>
+          </a:blip>
+          <a:srcRect/>
+          <a:stretch>
+            <a:fillRect/>
+          </a:stretch>
+        </p:blipFill>
+        <p:spPr bwMode="auto">
+          <a:xfrm>
+            <a:off x="3735312" y="2088754"/>
+            <a:ext cx="4478215" cy="1343465"/>
+          </a:xfrm>
+          <a:prstGeom prst="rect">
+            <a:avLst/>
+          </a:prstGeom>
+          <a:noFill/>
+          <a:extLst>
+            <a:ext uri="{909E8E84-426E-40DD-AFC4-6F175D3DCCD1}">
+              <a14:hiddenFill xmlns:a14="http://schemas.microsoft.com/office/drawing/2010/main">
+                <a:solidFill>
+                  <a:srgbClr val="FFFFFF"/>
+                </a:solidFill>
+              </a14:hiddenFill>
+            </a:ext>
+          </a:extLst>
+        </p:spPr>
+      </p:pic>
+      <p:pic>
+        <p:nvPicPr>
+          <p:cNvPr id="1030" name="Picture 6" descr="Pull-based Deployments">
+            <a:extLst>
+              <a:ext uri="{FF2B5EF4-FFF2-40B4-BE49-F238E27FC236}">
+                <a16:creationId xmlns:a16="http://schemas.microsoft.com/office/drawing/2014/main" id="{80BD10AC-4E10-419F-A9A0-82DF69F05370}"/>
+              </a:ext>
+            </a:extLst>
+          </p:cNvPr>
+          <p:cNvPicPr>
+            <a:picLocks noChangeAspect="1" noChangeArrowheads="1"/>
+          </p:cNvPicPr>
+          <p:nvPr/>
+        </p:nvPicPr>
+        <p:blipFill>
+          <a:blip r:embed="rId4" cstate="print">
+            <a:extLst>
+              <a:ext uri="{28A0092B-C50C-407E-A947-70E740481C1C}">
+                <a14:useLocalDpi xmlns:a14="http://schemas.microsoft.com/office/drawing/2010/main" val="0"/>
+              </a:ext>
+            </a:extLst>
+          </a:blip>
+          <a:srcRect/>
+          <a:stretch>
+            <a:fillRect/>
+          </a:stretch>
+        </p:blipFill>
+        <p:spPr bwMode="auto">
+          <a:xfrm>
+            <a:off x="3735312" y="3432219"/>
+            <a:ext cx="4478215" cy="1310811"/>
+          </a:xfrm>
+          <a:prstGeom prst="rect">
+            <a:avLst/>
+          </a:prstGeom>
+          <a:noFill/>
+          <a:extLst>
+            <a:ext uri="{909E8E84-426E-40DD-AFC4-6F175D3DCCD1}">
+              <a14:hiddenFill xmlns:a14="http://schemas.microsoft.com/office/drawing/2010/main">
+                <a:solidFill>
+                  <a:srgbClr val="FFFFFF"/>
+                </a:solidFill>
+              </a14:hiddenFill>
+            </a:ext>
+          </a:extLst>
+        </p:spPr>
+      </p:pic>
     </p:spTree>
     <p:extLst>
       <p:ext uri="{BB962C8B-B14F-4D97-AF65-F5344CB8AC3E}">
-        <p14:creationId xmlns:p14="http://schemas.microsoft.com/office/powerpoint/2010/main" val="3684633250"/>
+        <p14:creationId xmlns:p14="http://schemas.microsoft.com/office/powerpoint/2010/main" val="923229874"/>
       </p:ext>
     </p:extLst>
   </p:cSld>
   <p:clrMapOvr>
     <a:masterClrMapping/>
   </p:clrMapOvr>
-  <mc:AlternateContent xmlns:mc="http://schemas.openxmlformats.org/markup-compatibility/2006" xmlns:p14="http://schemas.microsoft.com/office/powerpoint/2010/main">
-    <mc:Choice Requires="p14">
+  <mc:AlternateContent xmlns:mc="http://schemas.openxmlformats.org/markup-compatibility/2006">
+    <mc:Choice xmlns:p14="http://schemas.microsoft.com/office/powerpoint/2010/main" Requires="p14">
       <p:transition spd="med" p14:dur="700">
         <p:fade/>
       </p:transition>
     </mc:Choice>
-    <mc:Fallback xmlns="">
+    <mc:Fallback>
       <p:transition spd="med">
         <p:fade/>
       </p:transition>
@@ -16875,7 +17581,7 @@
           <a:p>
             <a:r>
               <a:rPr lang="en-GB" dirty="0"/>
-              <a:t>EKScalibur CI/CD - Application</a:t>
+              <a:t>EKScalibur CI/CD</a:t>
             </a:r>
           </a:p>
         </p:txBody>
@@ -16901,7 +17607,47 @@
           <a:bodyPr/>
           <a:lstStyle/>
           <a:p>
+            <a:r>
+              <a:rPr lang="en-GB" b="1" i="1" dirty="0"/>
+              <a:t>Inspired</a:t>
+            </a:r>
+            <a:r>
+              <a:rPr lang="en-GB" b="1" dirty="0"/>
+              <a:t> </a:t>
+            </a:r>
+            <a:r>
+              <a:rPr lang="en-GB" dirty="0"/>
+              <a:t>by </a:t>
+            </a:r>
+            <a:r>
+              <a:rPr lang="en-GB" dirty="0" err="1"/>
+              <a:t>GitOps</a:t>
+            </a:r>
+            <a:r>
+              <a:rPr lang="en-GB" dirty="0"/>
+              <a:t> Push-based deployment and </a:t>
+            </a:r>
+            <a:r>
+              <a:rPr lang="en-GB" b="1" i="1" dirty="0"/>
+              <a:t>adapted</a:t>
+            </a:r>
+            <a:r>
+              <a:rPr lang="en-GB" i="1" dirty="0"/>
+              <a:t> </a:t>
+            </a:r>
+            <a:r>
+              <a:rPr lang="en-GB" dirty="0"/>
+              <a:t>to meet our organisation.</a:t>
+            </a:r>
+          </a:p>
+          <a:p>
             <a:endParaRPr lang="en-GB" dirty="0"/>
+          </a:p>
+          <a:p>
+            <a:r>
+              <a:rPr lang="en-GB" dirty="0"/>
+              <a:t> </a:t>
+            </a:r>
           </a:p>
         </p:txBody>
       </p:sp>
@@ -17025,10 +17771,57 @@
           </a:p>
         </p:txBody>
       </p:sp>
+      <p:pic>
+        <p:nvPicPr>
+          <p:cNvPr id="2050" name="Picture 2" descr="Multiple applications and environments">
+            <a:extLst>
+              <a:ext uri="{FF2B5EF4-FFF2-40B4-BE49-F238E27FC236}">
+                <a16:creationId xmlns:a16="http://schemas.microsoft.com/office/drawing/2014/main" id="{9B64E70C-B8DB-4D08-9CEC-2EB52961867D}"/>
+              </a:ext>
+            </a:extLst>
+          </p:cNvPr>
+          <p:cNvPicPr>
+            <a:picLocks noChangeAspect="1" noChangeArrowheads="1"/>
+          </p:cNvPicPr>
+          <p:nvPr/>
+        </p:nvPicPr>
+        <p:blipFill>
+          <a:blip r:embed="rId3" cstate="print">
+            <a:extLst>
+              <a:ext uri="{28A0092B-C50C-407E-A947-70E740481C1C}">
+                <a14:useLocalDpi xmlns:a14="http://schemas.microsoft.com/office/drawing/2010/main" val="0"/>
+              </a:ext>
+            </a:extLst>
+          </a:blip>
+          <a:srcRect/>
+          <a:stretch>
+            <a:fillRect/>
+          </a:stretch>
+        </p:blipFill>
+        <p:spPr bwMode="auto">
+          <a:xfrm>
+            <a:off x="1065982" y="2088754"/>
+            <a:ext cx="6994769" cy="1843413"/>
+          </a:xfrm>
+          <a:prstGeom prst="rect">
+            <a:avLst/>
+          </a:prstGeom>
+          <a:noFill/>
+          <a:extLst>
+            <a:ext uri="{909E8E84-426E-40DD-AFC4-6F175D3DCCD1}">
+              <a14:hiddenFill xmlns:a14="http://schemas.microsoft.com/office/drawing/2010/main">
+                <a:solidFill>
+                  <a:srgbClr val="FFFFFF"/>
+                </a:solidFill>
+              </a14:hiddenFill>
+            </a:ext>
+          </a:extLst>
+        </p:spPr>
+      </p:pic>
     </p:spTree>
     <p:extLst>
       <p:ext uri="{BB962C8B-B14F-4D97-AF65-F5344CB8AC3E}">
-        <p14:creationId xmlns:p14="http://schemas.microsoft.com/office/powerpoint/2010/main" val="2312897634"/>
+        <p14:creationId xmlns:p14="http://schemas.microsoft.com/office/powerpoint/2010/main" val="3684633250"/>
       </p:ext>
     </p:extLst>
   </p:cSld>
@@ -18042,18 +18835,18 @@
 </file>
 
 <file path=customXml/item2.xml><?xml version="1.0" encoding="utf-8"?>
+<p:properties xmlns:p="http://schemas.microsoft.com/office/2006/metadata/properties" xmlns:xsi="http://www.w3.org/2001/XMLSchema-instance" xmlns:pc="http://schemas.microsoft.com/office/infopath/2007/PartnerControls">
+  <documentManagement/>
+</p:properties>
+</file>
+
+<file path=customXml/item3.xml><?xml version="1.0" encoding="utf-8"?>
 <?mso-contentType ?>
 <FormTemplates xmlns="http://schemas.microsoft.com/sharepoint/v3/contenttype/forms">
   <Display>DocumentLibraryForm</Display>
   <Edit>DocumentLibraryForm</Edit>
   <New>DocumentLibraryForm</New>
 </FormTemplates>
-</file>
-
-<file path=customXml/item3.xml><?xml version="1.0" encoding="utf-8"?>
-<p:properties xmlns:p="http://schemas.microsoft.com/office/2006/metadata/properties" xmlns:xsi="http://www.w3.org/2001/XMLSchema-instance" xmlns:pc="http://schemas.microsoft.com/office/infopath/2007/PartnerControls">
-  <documentManagement/>
-</p:properties>
 </file>
 
 <file path=customXml/itemProps1.xml><?xml version="1.0" encoding="utf-8"?>
@@ -18076,14 +18869,6 @@
 </file>
 
 <file path=customXml/itemProps2.xml><?xml version="1.0" encoding="utf-8"?>
-<ds:datastoreItem xmlns:ds="http://schemas.openxmlformats.org/officeDocument/2006/customXml" ds:itemID="{C29A3346-F000-4F6F-AB76-A96757AA3082}">
-  <ds:schemaRefs>
-    <ds:schemaRef ds:uri="http://schemas.microsoft.com/sharepoint/v3/contenttype/forms"/>
-  </ds:schemaRefs>
-</ds:datastoreItem>
-</file>
-
-<file path=customXml/itemProps3.xml><?xml version="1.0" encoding="utf-8"?>
 <ds:datastoreItem xmlns:ds="http://schemas.openxmlformats.org/officeDocument/2006/customXml" ds:itemID="{66021384-24D2-40A2-B966-9D13A87106FF}">
   <ds:schemaRefs>
     <ds:schemaRef ds:uri="http://purl.org/dc/terms/"/>
@@ -18098,4 +18883,12 @@
     <ds:schemaRef ds:uri="ca37ec3c-be1b-4ee6-bd0b-42c8384143b7"/>
   </ds:schemaRefs>
 </ds:datastoreItem>
+</file>
+
+<file path=customXml/itemProps3.xml><?xml version="1.0" encoding="utf-8"?>
+<ds:datastoreItem xmlns:ds="http://schemas.openxmlformats.org/officeDocument/2006/customXml" ds:itemID="{C29A3346-F000-4F6F-AB76-A96757AA3082}">
+  <ds:schemaRefs>
+    <ds:schemaRef ds:uri="http://schemas.microsoft.com/sharepoint/v3/contenttype/forms"/>
+  </ds:schemaRefs>
+</ds:datastoreItem>
 </file>
</xml_diff>